<commit_message>
This is recent commit
</commit_message>
<xml_diff>
--- a/so.pptx
+++ b/so.pptx
@@ -7,6 +7,7 @@
   <p:sldIdLst>
     <p:sldId id="256" r:id="rId2"/>
     <p:sldId id="257" r:id="rId3"/>
+    <p:sldId id="258" r:id="rId4"/>
   </p:sldIdLst>
   <p:sldSz cx="12192000" cy="6858000"/>
   <p:notesSz cx="6858000" cy="9144000"/>
@@ -105,6 +106,11 @@
       </a:defRPr>
     </a:lvl9pPr>
   </p:defaultTextStyle>
+  <p:extLst>
+    <p:ext uri="{EFAFB233-063F-42B5-8137-9DF3F51BA10A}">
+      <p15:sldGuideLst xmlns:p15="http://schemas.microsoft.com/office/powerpoint/2012/main"/>
+    </p:ext>
+  </p:extLst>
 </p:presentation>
 </file>
 
@@ -153,7 +159,6 @@
               <a:rPr lang="en-US"/>
               <a:t>Click to edit Master title style</a:t>
             </a:r>
-            <a:endParaRPr lang="en-US"/>
           </a:p>
         </p:txBody>
       </p:sp>
@@ -218,7 +223,6 @@
               <a:rPr lang="en-US"/>
               <a:t>Click to edit Master subtitle style</a:t>
             </a:r>
-            <a:endParaRPr lang="en-US"/>
           </a:p>
         </p:txBody>
       </p:sp>
@@ -239,7 +243,7 @@
           <a:p>
             <a:fld id="{7A72A13E-7C1D-42E6-BFB5-7F097C03824A}" type="datetimeFigureOut">
               <a:rPr lang="en-US" smtClean="0"/>
-              <a:t>3/6/2017</a:t>
+              <a:t>3/8/2017</a:t>
             </a:fld>
             <a:endParaRPr lang="en-US"/>
           </a:p>
@@ -336,7 +340,6 @@
               <a:rPr lang="en-US"/>
               <a:t>Click to edit Master title style</a:t>
             </a:r>
-            <a:endParaRPr lang="en-US"/>
           </a:p>
         </p:txBody>
       </p:sp>
@@ -388,7 +391,6 @@
               <a:rPr lang="en-US"/>
               <a:t>Fifth level</a:t>
             </a:r>
-            <a:endParaRPr lang="en-US"/>
           </a:p>
         </p:txBody>
       </p:sp>
@@ -409,7 +411,7 @@
           <a:p>
             <a:fld id="{7A72A13E-7C1D-42E6-BFB5-7F097C03824A}" type="datetimeFigureOut">
               <a:rPr lang="en-US" smtClean="0"/>
-              <a:t>3/6/2017</a:t>
+              <a:t>3/8/2017</a:t>
             </a:fld>
             <a:endParaRPr lang="en-US"/>
           </a:p>
@@ -511,7 +513,6 @@
               <a:rPr lang="en-US"/>
               <a:t>Click to edit Master title style</a:t>
             </a:r>
-            <a:endParaRPr lang="en-US"/>
           </a:p>
         </p:txBody>
       </p:sp>
@@ -568,7 +569,6 @@
               <a:rPr lang="en-US"/>
               <a:t>Fifth level</a:t>
             </a:r>
-            <a:endParaRPr lang="en-US"/>
           </a:p>
         </p:txBody>
       </p:sp>
@@ -589,7 +589,7 @@
           <a:p>
             <a:fld id="{7A72A13E-7C1D-42E6-BFB5-7F097C03824A}" type="datetimeFigureOut">
               <a:rPr lang="en-US" smtClean="0"/>
-              <a:t>3/6/2017</a:t>
+              <a:t>3/8/2017</a:t>
             </a:fld>
             <a:endParaRPr lang="en-US"/>
           </a:p>
@@ -686,7 +686,6 @@
               <a:rPr lang="en-US"/>
               <a:t>Click to edit Master title style</a:t>
             </a:r>
-            <a:endParaRPr lang="en-US"/>
           </a:p>
         </p:txBody>
       </p:sp>
@@ -738,7 +737,6 @@
               <a:rPr lang="en-US"/>
               <a:t>Fifth level</a:t>
             </a:r>
-            <a:endParaRPr lang="en-US"/>
           </a:p>
         </p:txBody>
       </p:sp>
@@ -759,7 +757,7 @@
           <a:p>
             <a:fld id="{7A72A13E-7C1D-42E6-BFB5-7F097C03824A}" type="datetimeFigureOut">
               <a:rPr lang="en-US" smtClean="0"/>
-              <a:t>3/6/2017</a:t>
+              <a:t>3/8/2017</a:t>
             </a:fld>
             <a:endParaRPr lang="en-US"/>
           </a:p>
@@ -865,7 +863,6 @@
               <a:rPr lang="en-US"/>
               <a:t>Click to edit Master title style</a:t>
             </a:r>
-            <a:endParaRPr lang="en-US"/>
           </a:p>
         </p:txBody>
       </p:sp>
@@ -1005,7 +1002,7 @@
           <a:p>
             <a:fld id="{7A72A13E-7C1D-42E6-BFB5-7F097C03824A}" type="datetimeFigureOut">
               <a:rPr lang="en-US" smtClean="0"/>
-              <a:t>3/6/2017</a:t>
+              <a:t>3/8/2017</a:t>
             </a:fld>
             <a:endParaRPr lang="en-US"/>
           </a:p>
@@ -1102,7 +1099,6 @@
               <a:rPr lang="en-US"/>
               <a:t>Click to edit Master title style</a:t>
             </a:r>
-            <a:endParaRPr lang="en-US"/>
           </a:p>
         </p:txBody>
       </p:sp>
@@ -1159,7 +1155,6 @@
               <a:rPr lang="en-US"/>
               <a:t>Fifth level</a:t>
             </a:r>
-            <a:endParaRPr lang="en-US"/>
           </a:p>
         </p:txBody>
       </p:sp>
@@ -1216,7 +1211,6 @@
               <a:rPr lang="en-US"/>
               <a:t>Fifth level</a:t>
             </a:r>
-            <a:endParaRPr lang="en-US"/>
           </a:p>
         </p:txBody>
       </p:sp>
@@ -1237,7 +1231,7 @@
           <a:p>
             <a:fld id="{7A72A13E-7C1D-42E6-BFB5-7F097C03824A}" type="datetimeFigureOut">
               <a:rPr lang="en-US" smtClean="0"/>
-              <a:t>3/6/2017</a:t>
+              <a:t>3/8/2017</a:t>
             </a:fld>
             <a:endParaRPr lang="en-US"/>
           </a:p>
@@ -1339,7 +1333,6 @@
               <a:rPr lang="en-US"/>
               <a:t>Click to edit Master title style</a:t>
             </a:r>
-            <a:endParaRPr lang="en-US"/>
           </a:p>
         </p:txBody>
       </p:sp>
@@ -1461,7 +1454,6 @@
               <a:rPr lang="en-US"/>
               <a:t>Fifth level</a:t>
             </a:r>
-            <a:endParaRPr lang="en-US"/>
           </a:p>
         </p:txBody>
       </p:sp>
@@ -1583,7 +1575,6 @@
               <a:rPr lang="en-US"/>
               <a:t>Fifth level</a:t>
             </a:r>
-            <a:endParaRPr lang="en-US"/>
           </a:p>
         </p:txBody>
       </p:sp>
@@ -1604,7 +1595,7 @@
           <a:p>
             <a:fld id="{7A72A13E-7C1D-42E6-BFB5-7F097C03824A}" type="datetimeFigureOut">
               <a:rPr lang="en-US" smtClean="0"/>
-              <a:t>3/6/2017</a:t>
+              <a:t>3/8/2017</a:t>
             </a:fld>
             <a:endParaRPr lang="en-US"/>
           </a:p>
@@ -1701,7 +1692,6 @@
               <a:rPr lang="en-US"/>
               <a:t>Click to edit Master title style</a:t>
             </a:r>
-            <a:endParaRPr lang="en-US"/>
           </a:p>
         </p:txBody>
       </p:sp>
@@ -1722,7 +1712,7 @@
           <a:p>
             <a:fld id="{7A72A13E-7C1D-42E6-BFB5-7F097C03824A}" type="datetimeFigureOut">
               <a:rPr lang="en-US" smtClean="0"/>
-              <a:t>3/6/2017</a:t>
+              <a:t>3/8/2017</a:t>
             </a:fld>
             <a:endParaRPr lang="en-US"/>
           </a:p>
@@ -1817,7 +1807,7 @@
           <a:p>
             <a:fld id="{7A72A13E-7C1D-42E6-BFB5-7F097C03824A}" type="datetimeFigureOut">
               <a:rPr lang="en-US" smtClean="0"/>
-              <a:t>3/6/2017</a:t>
+              <a:t>3/8/2017</a:t>
             </a:fld>
             <a:endParaRPr lang="en-US"/>
           </a:p>
@@ -1923,7 +1913,6 @@
               <a:rPr lang="en-US"/>
               <a:t>Click to edit Master title style</a:t>
             </a:r>
-            <a:endParaRPr lang="en-US"/>
           </a:p>
         </p:txBody>
       </p:sp>
@@ -2008,7 +1997,6 @@
               <a:rPr lang="en-US"/>
               <a:t>Fifth level</a:t>
             </a:r>
-            <a:endParaRPr lang="en-US"/>
           </a:p>
         </p:txBody>
       </p:sp>
@@ -2094,7 +2082,7 @@
           <a:p>
             <a:fld id="{7A72A13E-7C1D-42E6-BFB5-7F097C03824A}" type="datetimeFigureOut">
               <a:rPr lang="en-US" smtClean="0"/>
-              <a:t>3/6/2017</a:t>
+              <a:t>3/8/2017</a:t>
             </a:fld>
             <a:endParaRPr lang="en-US"/>
           </a:p>
@@ -2200,7 +2188,6 @@
               <a:rPr lang="en-US"/>
               <a:t>Click to edit Master title style</a:t>
             </a:r>
-            <a:endParaRPr lang="en-US"/>
           </a:p>
         </p:txBody>
       </p:sp>
@@ -2347,7 +2334,7 @@
           <a:p>
             <a:fld id="{7A72A13E-7C1D-42E6-BFB5-7F097C03824A}" type="datetimeFigureOut">
               <a:rPr lang="en-US" smtClean="0"/>
-              <a:t>3/6/2017</a:t>
+              <a:t>3/8/2017</a:t>
             </a:fld>
             <a:endParaRPr lang="en-US"/>
           </a:p>
@@ -2459,7 +2446,6 @@
               <a:rPr lang="en-US"/>
               <a:t>Click to edit Master title style</a:t>
             </a:r>
-            <a:endParaRPr lang="en-US"/>
           </a:p>
         </p:txBody>
       </p:sp>
@@ -2521,7 +2507,6 @@
               <a:rPr lang="en-US"/>
               <a:t>Fifth level</a:t>
             </a:r>
-            <a:endParaRPr lang="en-US"/>
           </a:p>
         </p:txBody>
       </p:sp>
@@ -2560,7 +2545,7 @@
           <a:p>
             <a:fld id="{7A72A13E-7C1D-42E6-BFB5-7F097C03824A}" type="datetimeFigureOut">
               <a:rPr lang="en-US" smtClean="0"/>
-              <a:t>3/6/2017</a:t>
+              <a:t>3/8/2017</a:t>
             </a:fld>
             <a:endParaRPr lang="en-US"/>
           </a:p>
@@ -3108,6 +3093,78 @@
 </p:sld>
 </file>
 
+<file path=ppt/slides/slide3.xml><?xml version="1.0" encoding="utf-8"?>
+<p:sld xmlns:a="http://schemas.openxmlformats.org/drawingml/2006/main" xmlns:r="http://schemas.openxmlformats.org/officeDocument/2006/relationships" xmlns:p="http://schemas.openxmlformats.org/presentationml/2006/main">
+  <p:cSld>
+    <p:spTree>
+      <p:nvGrpSpPr>
+        <p:cNvPr id="1" name=""/>
+        <p:cNvGrpSpPr/>
+        <p:nvPr/>
+      </p:nvGrpSpPr>
+      <p:grpSpPr>
+        <a:xfrm>
+          <a:off x="0" y="0"/>
+          <a:ext cx="0" cy="0"/>
+          <a:chOff x="0" y="0"/>
+          <a:chExt cx="0" cy="0"/>
+        </a:xfrm>
+      </p:grpSpPr>
+      <p:sp>
+        <p:nvSpPr>
+          <p:cNvPr id="2" name="Title 1"/>
+          <p:cNvSpPr>
+            <a:spLocks noGrp="1"/>
+          </p:cNvSpPr>
+          <p:nvPr>
+            <p:ph type="title"/>
+          </p:nvPr>
+        </p:nvSpPr>
+        <p:spPr/>
+        <p:txBody>
+          <a:bodyPr/>
+          <a:lstStyle/>
+          <a:p>
+            <a:r>
+              <a:rPr lang="en-US"/>
+              <a:t>Output</a:t>
+            </a:r>
+            <a:endParaRPr lang="en-US"/>
+          </a:p>
+        </p:txBody>
+      </p:sp>
+      <p:sp>
+        <p:nvSpPr>
+          <p:cNvPr id="3" name="Content Placeholder 2"/>
+          <p:cNvSpPr>
+            <a:spLocks noGrp="1"/>
+          </p:cNvSpPr>
+          <p:nvPr>
+            <p:ph idx="1"/>
+          </p:nvPr>
+        </p:nvSpPr>
+        <p:spPr/>
+        <p:txBody>
+          <a:bodyPr/>
+          <a:lstStyle/>
+          <a:p>
+            <a:endParaRPr lang="en-US"/>
+          </a:p>
+        </p:txBody>
+      </p:sp>
+    </p:spTree>
+    <p:extLst>
+      <p:ext uri="{BB962C8B-B14F-4D97-AF65-F5344CB8AC3E}">
+        <p14:creationId xmlns:p14="http://schemas.microsoft.com/office/powerpoint/2010/main" val="3229528352"/>
+      </p:ext>
+    </p:extLst>
+  </p:cSld>
+  <p:clrMapOvr>
+    <a:masterClrMapping/>
+  </p:clrMapOvr>
+</p:sld>
+</file>
+
 <file path=ppt/theme/theme1.xml><?xml version="1.0" encoding="utf-8"?>
 <a:theme xmlns:a="http://schemas.openxmlformats.org/drawingml/2006/main" name="Office Theme">
   <a:themeElements>

</xml_diff>